<commit_message>
Revert "Update v3 diapo"
This reverts commit 18632e1ff3f92c95f3aa12d7828fd9fd38fcf9f9.
</commit_message>
<xml_diff>
--- a/TERS2 Suivi.pptx
+++ b/TERS2 Suivi.pptx
@@ -6005,10 +6005,7 @@
           <a:lstStyle/>
           <a:p>
             <a:r>
-              <a:rPr lang="fr-FR" dirty="0">
-                <a:latin typeface="Times New Roman" panose="02020603050405020304" pitchFamily="18" charset="0"/>
-                <a:cs typeface="Times New Roman" panose="02020603050405020304" pitchFamily="18" charset="0"/>
-              </a:rPr>
+              <a:rPr lang="fr-FR" dirty="0"/>
               <a:t>TER 2021</a:t>
             </a:r>
           </a:p>
@@ -6043,38 +6040,23 @@
           <a:lstStyle/>
           <a:p>
             <a:r>
-              <a:rPr lang="fr-FR" dirty="0">
-                <a:latin typeface="Times New Roman" panose="02020603050405020304" pitchFamily="18" charset="0"/>
-                <a:cs typeface="Times New Roman" panose="02020603050405020304" pitchFamily="18" charset="0"/>
-              </a:rPr>
+              <a:rPr lang="fr-FR" dirty="0"/>
               <a:t>Génération de moniteur </a:t>
             </a:r>
             <a:r>
-              <a:rPr lang="fr-FR" dirty="0" err="1">
-                <a:latin typeface="Times New Roman" panose="02020603050405020304" pitchFamily="18" charset="0"/>
-                <a:cs typeface="Times New Roman" panose="02020603050405020304" pitchFamily="18" charset="0"/>
-              </a:rPr>
+              <a:rPr lang="fr-FR" dirty="0" err="1"/>
               <a:t>Scade</a:t>
             </a:r>
             <a:r>
-              <a:rPr lang="fr-FR" dirty="0">
-                <a:latin typeface="Times New Roman" panose="02020603050405020304" pitchFamily="18" charset="0"/>
-                <a:cs typeface="Times New Roman" panose="02020603050405020304" pitchFamily="18" charset="0"/>
-              </a:rPr>
+              <a:rPr lang="fr-FR" dirty="0"/>
               <a:t> à partir de scénario de </a:t>
             </a:r>
             <a:r>
-              <a:rPr lang="fr-FR" dirty="0" err="1">
-                <a:latin typeface="Times New Roman" panose="02020603050405020304" pitchFamily="18" charset="0"/>
-                <a:cs typeface="Times New Roman" panose="02020603050405020304" pitchFamily="18" charset="0"/>
-              </a:rPr>
+              <a:rPr lang="fr-FR" dirty="0" err="1"/>
               <a:t>safety</a:t>
             </a:r>
             <a:r>
-              <a:rPr lang="fr-FR" dirty="0">
-                <a:latin typeface="Times New Roman" panose="02020603050405020304" pitchFamily="18" charset="0"/>
-                <a:cs typeface="Times New Roman" panose="02020603050405020304" pitchFamily="18" charset="0"/>
-              </a:rPr>
+              <a:rPr lang="fr-FR" dirty="0"/>
               <a:t> pour le véhicule autonome</a:t>
             </a:r>
           </a:p>
@@ -6109,10 +6091,7 @@
           <a:lstStyle/>
           <a:p>
             <a:r>
-              <a:rPr lang="fr-FR" dirty="0">
-                <a:latin typeface="Times New Roman" panose="02020603050405020304" pitchFamily="18" charset="0"/>
-                <a:cs typeface="Times New Roman" panose="02020603050405020304" pitchFamily="18" charset="0"/>
-              </a:rPr>
+              <a:rPr lang="fr-FR" dirty="0"/>
               <a:t>Etudiants:</a:t>
             </a:r>
           </a:p>
@@ -6122,10 +6101,7 @@
               <a:buChar char="-"/>
             </a:pPr>
             <a:r>
-              <a:rPr lang="fr-FR" dirty="0">
-                <a:latin typeface="Times New Roman" panose="02020603050405020304" pitchFamily="18" charset="0"/>
-                <a:cs typeface="Times New Roman" panose="02020603050405020304" pitchFamily="18" charset="0"/>
-              </a:rPr>
+              <a:rPr lang="fr-FR" dirty="0"/>
               <a:t>MARINO Samuele</a:t>
             </a:r>
           </a:p>
@@ -6135,10 +6111,7 @@
               <a:buChar char="-"/>
             </a:pPr>
             <a:r>
-              <a:rPr lang="fr-FR" dirty="0">
-                <a:latin typeface="Times New Roman" panose="02020603050405020304" pitchFamily="18" charset="0"/>
-                <a:cs typeface="Times New Roman" panose="02020603050405020304" pitchFamily="18" charset="0"/>
-              </a:rPr>
+              <a:rPr lang="fr-FR" dirty="0"/>
               <a:t>LAUBRY Vincent</a:t>
             </a:r>
           </a:p>
@@ -6173,10 +6146,7 @@
           <a:lstStyle/>
           <a:p>
             <a:r>
-              <a:rPr lang="fr-FR" dirty="0">
-                <a:latin typeface="Times New Roman" panose="02020603050405020304" pitchFamily="18" charset="0"/>
-                <a:cs typeface="Times New Roman" panose="02020603050405020304" pitchFamily="18" charset="0"/>
-              </a:rPr>
+              <a:rPr lang="fr-FR" dirty="0"/>
               <a:t>Encadrants:</a:t>
             </a:r>
           </a:p>
@@ -6186,10 +6156,7 @@
               <a:buChar char="-"/>
             </a:pPr>
             <a:r>
-              <a:rPr lang="fr-FR" dirty="0">
-                <a:latin typeface="Times New Roman" panose="02020603050405020304" pitchFamily="18" charset="0"/>
-                <a:cs typeface="Times New Roman" panose="02020603050405020304" pitchFamily="18" charset="0"/>
-              </a:rPr>
+              <a:rPr lang="fr-FR" dirty="0"/>
               <a:t>MALLET Frédéric</a:t>
             </a:r>
           </a:p>
@@ -6199,10 +6166,7 @@
               <a:buChar char="-"/>
             </a:pPr>
             <a:r>
-              <a:rPr lang="fr-FR" dirty="0">
-                <a:latin typeface="Times New Roman" panose="02020603050405020304" pitchFamily="18" charset="0"/>
-                <a:cs typeface="Times New Roman" panose="02020603050405020304" pitchFamily="18" charset="0"/>
-              </a:rPr>
+              <a:rPr lang="fr-FR" dirty="0"/>
               <a:t>BOUALI Amar</a:t>
             </a:r>
           </a:p>
@@ -6314,10 +6278,7 @@
           <a:lstStyle/>
           <a:p>
             <a:r>
-              <a:rPr lang="fr-FR" dirty="0">
-                <a:latin typeface="Times New Roman" panose="02020603050405020304" pitchFamily="18" charset="0"/>
-                <a:cs typeface="Times New Roman" panose="02020603050405020304" pitchFamily="18" charset="0"/>
-              </a:rPr>
+              <a:rPr lang="fr-FR" dirty="0"/>
               <a:t>Contexte</a:t>
             </a:r>
           </a:p>
@@ -6347,7 +6308,7 @@
         </p:spPr>
         <p:txBody>
           <a:bodyPr>
-            <a:normAutofit/>
+            <a:normAutofit fontScale="92500" lnSpcReduction="10000"/>
           </a:bodyPr>
           <a:lstStyle/>
           <a:p>
@@ -6356,11 +6317,8 @@
               <a:buChar char="•"/>
             </a:pPr>
             <a:r>
-              <a:rPr lang="fr-FR" sz="1400" dirty="0">
-                <a:latin typeface="Times New Roman" panose="02020603050405020304" pitchFamily="18" charset="0"/>
-                <a:cs typeface="Times New Roman" panose="02020603050405020304" pitchFamily="18" charset="0"/>
-              </a:rPr>
-              <a:t>En partant des scenarios de sureté établis par les ingénieurs Renault, réussir a les coder, les implémenter en logiciels de systèmes embarqués et les simuler</a:t>
+              <a:rPr lang="fr-FR" dirty="0"/>
+              <a:t>En partant des scenarios de sureté établis par les ingénieurs Renault, réussir a les coder, les implémenter en logiciels de systèmes embarqués et de les simuler</a:t>
             </a:r>
           </a:p>
           <a:p>
@@ -6369,10 +6327,7 @@
               <a:buChar char="•"/>
             </a:pPr>
             <a:r>
-              <a:rPr lang="fr-FR" sz="1400" dirty="0">
-                <a:latin typeface="Times New Roman" panose="02020603050405020304" pitchFamily="18" charset="0"/>
-                <a:cs typeface="Times New Roman" panose="02020603050405020304" pitchFamily="18" charset="0"/>
-              </a:rPr>
+              <a:rPr lang="fr-FR" dirty="0"/>
               <a:t>Utilisation du langage CCSL pour coder les scénarios</a:t>
             </a:r>
           </a:p>
@@ -6382,11 +6337,8 @@
               <a:buChar char="•"/>
             </a:pPr>
             <a:r>
-              <a:rPr lang="fr-FR" sz="1400" dirty="0">
-                <a:latin typeface="Times New Roman" panose="02020603050405020304" pitchFamily="18" charset="0"/>
-                <a:cs typeface="Times New Roman" panose="02020603050405020304" pitchFamily="18" charset="0"/>
-              </a:rPr>
-              <a:t>Utilisation de l’environnement SCADE pour modéliser les scénarios générés par CCSL</a:t>
+              <a:rPr lang="fr-FR" dirty="0"/>
+              <a:t>Utilisation de l’environnement SCADE pour modéliser les scénarios généré par CCSL</a:t>
             </a:r>
           </a:p>
           <a:p>
@@ -6395,10 +6347,7 @@
               <a:buChar char="•"/>
             </a:pPr>
             <a:r>
-              <a:rPr lang="fr-FR" sz="1400" dirty="0">
-                <a:latin typeface="Times New Roman" panose="02020603050405020304" pitchFamily="18" charset="0"/>
-                <a:cs typeface="Times New Roman" panose="02020603050405020304" pitchFamily="18" charset="0"/>
-              </a:rPr>
+              <a:rPr lang="fr-FR" dirty="0"/>
               <a:t>Simuler les modèles par LGSVL Simulator</a:t>
             </a:r>
           </a:p>
@@ -6408,11 +6357,8 @@
               <a:buChar char="•"/>
             </a:pPr>
             <a:r>
-              <a:rPr lang="fr-FR" sz="1400" dirty="0">
-                <a:latin typeface="Times New Roman" panose="02020603050405020304" pitchFamily="18" charset="0"/>
-                <a:cs typeface="Times New Roman" panose="02020603050405020304" pitchFamily="18" charset="0"/>
-              </a:rPr>
-              <a:t>A priori, rendre le process le plus automatique possible</a:t>
+              <a:rPr lang="fr-FR" dirty="0"/>
+              <a:t>A priori, rendre le procès le plus automatique possible</a:t>
             </a:r>
           </a:p>
         </p:txBody>
@@ -6514,13 +6460,13 @@
         </p:nvSpPr>
         <p:spPr>
           <a:xfrm>
-            <a:off x="628073" y="1570977"/>
-            <a:ext cx="4189079" cy="3716046"/>
+            <a:off x="1030575" y="1457563"/>
+            <a:ext cx="3549121" cy="3716046"/>
           </a:xfrm>
         </p:spPr>
         <p:txBody>
           <a:bodyPr>
-            <a:noAutofit/>
+            <a:normAutofit fontScale="92500" lnSpcReduction="10000"/>
           </a:bodyPr>
           <a:lstStyle/>
           <a:p>
@@ -6529,23 +6475,19 @@
               <a:buChar char="•"/>
             </a:pPr>
             <a:r>
-              <a:rPr lang="fr-FR" sz="1400" dirty="0">
-                <a:latin typeface="Times New Roman" panose="02020603050405020304" pitchFamily="18" charset="0"/>
-                <a:cs typeface="Times New Roman" panose="02020603050405020304" pitchFamily="18" charset="0"/>
-              </a:rPr>
-              <a:t>Convertir des scénarios décrits via Excel par les ingénieurs Renault, en </a:t>
-            </a:r>
-            <a:r>
-              <a:rPr lang="fr-FR" sz="1400" dirty="0" err="1">
-                <a:latin typeface="Times New Roman" panose="02020603050405020304" pitchFamily="18" charset="0"/>
-                <a:cs typeface="Times New Roman" panose="02020603050405020304" pitchFamily="18" charset="0"/>
-              </a:rPr>
-              <a:t>ccsl</a:t>
-            </a:r>
-            <a:endParaRPr lang="fr-FR" sz="1400" dirty="0">
-              <a:latin typeface="Times New Roman" panose="02020603050405020304" pitchFamily="18" charset="0"/>
-              <a:cs typeface="Times New Roman" panose="02020603050405020304" pitchFamily="18" charset="0"/>
-            </a:endParaRPr>
+              <a:rPr lang="fr-FR" dirty="0"/>
+              <a:t>Donnée des versions CCSL aux scénarios décrits en Excel par les ingénieurs Renault</a:t>
+            </a:r>
+          </a:p>
+          <a:p>
+            <a:pPr marL="742950" lvl="1" indent="-285750">
+              <a:buFont typeface="Arial" panose="020B0604020202020204" pitchFamily="34" charset="0"/>
+              <a:buChar char="•"/>
+            </a:pPr>
+            <a:r>
+              <a:rPr lang="fr-FR" dirty="0"/>
+              <a:t>En attente de vérification, notre encadrant nous informera toute suite après cette réunion de suivi</a:t>
+            </a:r>
           </a:p>
           <a:p>
             <a:pPr marL="285750" indent="-285750">
@@ -6553,11 +6495,26 @@
               <a:buChar char="•"/>
             </a:pPr>
             <a:r>
-              <a:rPr lang="fr-FR" sz="1400" dirty="0">
-                <a:latin typeface="Times New Roman" panose="02020603050405020304" pitchFamily="18" charset="0"/>
-                <a:cs typeface="Times New Roman" panose="02020603050405020304" pitchFamily="18" charset="0"/>
-              </a:rPr>
-              <a:t>En attente de vérification, notre encadrant nous informera toute suite après cette réunion de suivi</a:t>
+              <a:rPr lang="fr-FR" dirty="0"/>
+              <a:t>Implémentation operateurs qui serviront à la création des scénarios en SCADE</a:t>
+            </a:r>
+          </a:p>
+          <a:p>
+            <a:pPr marL="742950" lvl="1" indent="-285750">
+              <a:buFont typeface="Arial" panose="020B0604020202020204" pitchFamily="34" charset="0"/>
+              <a:buChar char="•"/>
+            </a:pPr>
+            <a:r>
+              <a:rPr lang="fr-FR" dirty="0"/>
+              <a:t>Limites rencontrés par SCADE </a:t>
+            </a:r>
+            <a:r>
+              <a:rPr lang="fr-FR" dirty="0" err="1"/>
+              <a:t>Student</a:t>
+            </a:r>
+            <a:r>
+              <a:rPr lang="fr-FR" dirty="0"/>
+              <a:t>, en attente d’avoir une version plus complète</a:t>
             </a:r>
           </a:p>
           <a:p>
@@ -6566,11 +6523,8 @@
               <a:buChar char="•"/>
             </a:pPr>
             <a:r>
-              <a:rPr lang="fr-FR" sz="1400" dirty="0">
-                <a:latin typeface="Times New Roman" panose="02020603050405020304" pitchFamily="18" charset="0"/>
-                <a:cs typeface="Times New Roman" panose="02020603050405020304" pitchFamily="18" charset="0"/>
-              </a:rPr>
-              <a:t>Implémentation des operateurs qui serviront à la création des scénarios en SCADE</a:t>
+              <a:rPr lang="fr-FR" dirty="0"/>
+              <a:t>Prochainement:</a:t>
             </a:r>
           </a:p>
           <a:p>
@@ -6579,38 +6533,8 @@
               <a:buChar char="•"/>
             </a:pPr>
             <a:r>
-              <a:rPr lang="fr-FR" sz="1400" dirty="0">
-                <a:latin typeface="Times New Roman" panose="02020603050405020304" pitchFamily="18" charset="0"/>
-                <a:cs typeface="Times New Roman" panose="02020603050405020304" pitchFamily="18" charset="0"/>
-              </a:rPr>
-              <a:t>Limites rencontrés par SCADE </a:t>
-            </a:r>
-            <a:r>
-              <a:rPr lang="fr-FR" sz="1400" dirty="0" err="1">
-                <a:latin typeface="Times New Roman" panose="02020603050405020304" pitchFamily="18" charset="0"/>
-                <a:cs typeface="Times New Roman" panose="02020603050405020304" pitchFamily="18" charset="0"/>
-              </a:rPr>
-              <a:t>Student</a:t>
-            </a:r>
-            <a:r>
-              <a:rPr lang="fr-FR" sz="1400" dirty="0">
-                <a:latin typeface="Times New Roman" panose="02020603050405020304" pitchFamily="18" charset="0"/>
-                <a:cs typeface="Times New Roman" panose="02020603050405020304" pitchFamily="18" charset="0"/>
-              </a:rPr>
-              <a:t>, en attente d’avoir une version plus complète</a:t>
-            </a:r>
-          </a:p>
-          <a:p>
-            <a:pPr marL="285750" indent="-285750">
-              <a:buFont typeface="Arial" panose="020B0604020202020204" pitchFamily="34" charset="0"/>
-              <a:buChar char="•"/>
-            </a:pPr>
-            <a:r>
-              <a:rPr lang="fr-FR" sz="1400" dirty="0">
-                <a:latin typeface="Times New Roman" panose="02020603050405020304" pitchFamily="18" charset="0"/>
-                <a:cs typeface="Times New Roman" panose="02020603050405020304" pitchFamily="18" charset="0"/>
-              </a:rPr>
-              <a:t>Prochainement:</a:t>
+              <a:rPr lang="fr-FR" dirty="0"/>
+              <a:t>Totalités des scénarios dans SCADE</a:t>
             </a:r>
           </a:p>
           <a:p>
@@ -6619,23 +6543,7 @@
               <a:buChar char="•"/>
             </a:pPr>
             <a:r>
-              <a:rPr lang="fr-FR" sz="1400" dirty="0">
-                <a:latin typeface="Times New Roman" panose="02020603050405020304" pitchFamily="18" charset="0"/>
-                <a:cs typeface="Times New Roman" panose="02020603050405020304" pitchFamily="18" charset="0"/>
-              </a:rPr>
-              <a:t>Totalités des scénarios dans SCADE</a:t>
-            </a:r>
-          </a:p>
-          <a:p>
-            <a:pPr marL="742950" lvl="1" indent="-285750">
-              <a:buFont typeface="Arial" panose="020B0604020202020204" pitchFamily="34" charset="0"/>
-              <a:buChar char="•"/>
-            </a:pPr>
-            <a:r>
-              <a:rPr lang="fr-FR" sz="1400" dirty="0">
-                <a:latin typeface="Times New Roman" panose="02020603050405020304" pitchFamily="18" charset="0"/>
-                <a:cs typeface="Times New Roman" panose="02020603050405020304" pitchFamily="18" charset="0"/>
-              </a:rPr>
+              <a:rPr lang="fr-FR" dirty="0"/>
               <a:t>Interface visuelle donnée par le simulateur, qui simulera les scénarios générés</a:t>
             </a:r>
           </a:p>
@@ -6715,7 +6623,7 @@
         </p:spPr>
         <p:txBody>
           <a:bodyPr vert="horz" lIns="91440" tIns="45720" rIns="91440" bIns="45720" rtlCol="0" anchor="b">
-            <a:normAutofit fontScale="97500"/>
+            <a:normAutofit fontScale="90000"/>
           </a:bodyPr>
           <a:lstStyle>
             <a:lvl1pPr algn="l" defTabSz="457200" rtl="0" eaLnBrk="1" latinLnBrk="0" hangingPunct="1">
@@ -6819,10 +6727,7 @@
           </a:lstStyle>
           <a:p>
             <a:r>
-              <a:rPr lang="fr-FR" dirty="0">
-                <a:latin typeface="Times New Roman" panose="02020603050405020304" pitchFamily="18" charset="0"/>
-                <a:cs typeface="Times New Roman" panose="02020603050405020304" pitchFamily="18" charset="0"/>
-              </a:rPr>
+              <a:rPr lang="fr-FR" dirty="0"/>
               <a:t>AVANCEMENT</a:t>
             </a:r>
           </a:p>

</xml_diff>